<commit_message>
fixed schedule, some typos, and minor rewording
</commit_message>
<xml_diff>
--- a/slides/00-OOPython.pptx
+++ b/slides/00-OOPython.pptx
@@ -217,7 +217,7 @@
           <a:p>
             <a:fld id="{27CEEA13-23F5-194B-B1CF-CF175090CBFA}" type="datetimeFigureOut">
               <a:rPr lang="en-US" smtClean="0"/>
-              <a:t>7/4/18</a:t>
+              <a:t>8/13/18</a:t>
             </a:fld>
             <a:endParaRPr lang="en-US"/>
           </a:p>
@@ -1481,7 +1481,7 @@
           <a:p>
             <a:fld id="{2DD5D53E-635E-BD41-B5CC-A796D6DD661B}" type="datetimeFigureOut">
               <a:rPr lang="en-US" smtClean="0"/>
-              <a:t>7/4/18</a:t>
+              <a:t>8/13/18</a:t>
             </a:fld>
             <a:endParaRPr lang="en-US"/>
           </a:p>
@@ -1811,7 +1811,7 @@
           <a:p>
             <a:fld id="{2DD5D53E-635E-BD41-B5CC-A796D6DD661B}" type="datetimeFigureOut">
               <a:rPr lang="en-US" smtClean="0"/>
-              <a:t>7/4/18</a:t>
+              <a:t>8/13/18</a:t>
             </a:fld>
             <a:endParaRPr lang="en-US"/>
           </a:p>
@@ -1991,7 +1991,7 @@
           <a:p>
             <a:fld id="{2DD5D53E-635E-BD41-B5CC-A796D6DD661B}" type="datetimeFigureOut">
               <a:rPr lang="en-US" smtClean="0"/>
-              <a:t>7/4/18</a:t>
+              <a:t>8/13/18</a:t>
             </a:fld>
             <a:endParaRPr lang="en-US"/>
           </a:p>
@@ -2161,7 +2161,7 @@
           <a:p>
             <a:fld id="{2DD5D53E-635E-BD41-B5CC-A796D6DD661B}" type="datetimeFigureOut">
               <a:rPr lang="en-US" smtClean="0"/>
-              <a:t>7/4/18</a:t>
+              <a:t>8/13/18</a:t>
             </a:fld>
             <a:endParaRPr lang="en-US"/>
           </a:p>
@@ -2433,7 +2433,7 @@
           <a:p>
             <a:fld id="{2DD5D53E-635E-BD41-B5CC-A796D6DD661B}" type="datetimeFigureOut">
               <a:rPr lang="en-US" smtClean="0"/>
-              <a:t>7/4/18</a:t>
+              <a:t>8/13/18</a:t>
             </a:fld>
             <a:endParaRPr lang="en-US"/>
           </a:p>
@@ -2827,7 +2827,7 @@
           <a:p>
             <a:fld id="{2DD5D53E-635E-BD41-B5CC-A796D6DD661B}" type="datetimeFigureOut">
               <a:rPr lang="en-US" smtClean="0"/>
-              <a:t>7/4/18</a:t>
+              <a:t>8/13/18</a:t>
             </a:fld>
             <a:endParaRPr lang="en-US"/>
           </a:p>
@@ -3304,7 +3304,7 @@
           <a:p>
             <a:fld id="{2DD5D53E-635E-BD41-B5CC-A796D6DD661B}" type="datetimeFigureOut">
               <a:rPr lang="en-US" smtClean="0"/>
-              <a:t>7/4/18</a:t>
+              <a:t>8/13/18</a:t>
             </a:fld>
             <a:endParaRPr lang="en-US"/>
           </a:p>
@@ -3422,7 +3422,7 @@
           <a:p>
             <a:fld id="{2DD5D53E-635E-BD41-B5CC-A796D6DD661B}" type="datetimeFigureOut">
               <a:rPr lang="en-US" smtClean="0"/>
-              <a:t>7/4/18</a:t>
+              <a:t>8/13/18</a:t>
             </a:fld>
             <a:endParaRPr lang="en-US"/>
           </a:p>
@@ -3517,7 +3517,7 @@
           <a:p>
             <a:fld id="{2DD5D53E-635E-BD41-B5CC-A796D6DD661B}" type="datetimeFigureOut">
               <a:rPr lang="en-US" smtClean="0"/>
-              <a:t>7/4/18</a:t>
+              <a:t>8/13/18</a:t>
             </a:fld>
             <a:endParaRPr lang="en-US"/>
           </a:p>
@@ -3863,7 +3863,7 @@
           <a:p>
             <a:fld id="{2DD5D53E-635E-BD41-B5CC-A796D6DD661B}" type="datetimeFigureOut">
               <a:rPr lang="en-US" smtClean="0"/>
-              <a:t>7/4/18</a:t>
+              <a:t>8/13/18</a:t>
             </a:fld>
             <a:endParaRPr lang="en-US"/>
           </a:p>
@@ -4251,7 +4251,7 @@
           <a:p>
             <a:fld id="{2DD5D53E-635E-BD41-B5CC-A796D6DD661B}" type="datetimeFigureOut">
               <a:rPr lang="en-US" smtClean="0"/>
-              <a:t>7/4/18</a:t>
+              <a:t>8/13/18</a:t>
             </a:fld>
             <a:endParaRPr lang="en-US"/>
           </a:p>
@@ -4526,7 +4526,7 @@
           <a:p>
             <a:fld id="{2DD5D53E-635E-BD41-B5CC-A796D6DD661B}" type="datetimeFigureOut">
               <a:rPr lang="en-US" smtClean="0"/>
-              <a:t>7/4/18</a:t>
+              <a:t>8/13/18</a:t>
             </a:fld>
             <a:endParaRPr lang="en-US"/>
           </a:p>
@@ -13077,20 +13077,16 @@
           <a:lstStyle/>
           <a:p>
             <a:r>
+              <a:rPr lang="en-US" dirty="0">
+                <a:latin typeface="Menlo" panose="020B0609030804020204" pitchFamily="49" charset="0"/>
+                <a:ea typeface="Menlo" panose="020B0609030804020204" pitchFamily="49" charset="0"/>
+                <a:cs typeface="Menlo" panose="020B0609030804020204" pitchFamily="49" charset="0"/>
+              </a:rPr>
+              <a:t>self</a:t>
+            </a:r>
+            <a:r>
               <a:rPr lang="en-US" dirty="0"/>
-              <a:t>must always take </a:t>
-            </a:r>
-            <a:r>
-              <a:rPr lang="en-US" dirty="0">
-                <a:latin typeface="Menlo" panose="020B0609030804020204" pitchFamily="49" charset="0"/>
-                <a:ea typeface="Menlo" panose="020B0609030804020204" pitchFamily="49" charset="0"/>
-                <a:cs typeface="Menlo" panose="020B0609030804020204" pitchFamily="49" charset="0"/>
-              </a:rPr>
-              <a:t>self</a:t>
-            </a:r>
-            <a:r>
-              <a:rPr lang="en-US" dirty="0"/>
-              <a:t> as first parameter</a:t>
+              <a:t> is first parameter by convention</a:t>
             </a:r>
           </a:p>
         </p:txBody>
@@ -21768,7 +21764,7 @@
           <a:p>
             <a:r>
               <a:rPr lang="en-US" dirty="0"/>
-              <a:t>Python is weakly typed</a:t>
+              <a:t>Python is dynamically typed</a:t>
             </a:r>
           </a:p>
           <a:p>
@@ -21961,6 +21957,7 @@
             </a:r>
           </a:p>
           <a:p>
+            <a:pPr lvl="1"/>
             <a:r>
               <a:rPr lang="en-US" dirty="0"/>
               <a:t>3</a:t>
@@ -21975,12 +21972,14 @@
             </a:r>
           </a:p>
           <a:p>
+            <a:pPr lvl="1"/>
             <a:r>
               <a:rPr lang="en-US" dirty="0"/>
               <a:t>Grew up in Charlottesville</a:t>
             </a:r>
           </a:p>
           <a:p>
+            <a:pPr lvl="1"/>
             <a:r>
               <a:rPr lang="en-US" dirty="0"/>
               <a:t>Learned about metaprogramming through personal projects</a:t>
@@ -21989,7 +21988,7 @@
           <a:p>
             <a:r>
               <a:rPr lang="en-US" dirty="0"/>
-              <a:t>I want to share some of this techniques with you</a:t>
+              <a:t>I want to share some of these techniques with you!</a:t>
             </a:r>
           </a:p>
         </p:txBody>
@@ -24853,7 +24852,7 @@
           <a:p>
             <a:r>
               <a:rPr lang="en-US" dirty="0"/>
-              <a:t>First-Class Functions		July 14</a:t>
+              <a:t>First-Class Functions		July 17</a:t>
             </a:r>
             <a:r>
               <a:rPr lang="en-US" baseline="30000" dirty="0"/>
@@ -24867,15 +24866,7 @@
           <a:p>
             <a:r>
               <a:rPr lang="en-US" dirty="0"/>
-              <a:t>Closures and Decorators	July 21</a:t>
-            </a:r>
-            <a:r>
-              <a:rPr lang="en-US" baseline="30000" dirty="0"/>
-              <a:t>st</a:t>
-            </a:r>
-            <a:r>
-              <a:rPr lang="en-US" dirty="0"/>
-              <a:t> and 28</a:t>
+              <a:t>Closures and Decorators	July 24</a:t>
             </a:r>
             <a:r>
               <a:rPr lang="en-US" baseline="30000" dirty="0"/>
@@ -24883,6 +24874,14 @@
             </a:r>
             <a:r>
               <a:rPr lang="en-US" dirty="0"/>
+              <a:t> and Oct 1</a:t>
+            </a:r>
+            <a:r>
+              <a:rPr lang="en-US" baseline="30000" dirty="0"/>
+              <a:t>tst</a:t>
+            </a:r>
+            <a:r>
+              <a:rPr lang="en-US" dirty="0"/>
               <a:t> </a:t>
             </a:r>
           </a:p>
@@ -24897,7 +24896,7 @@
             </a:r>
             <a:r>
               <a:rPr lang="en-US" dirty="0"/>
-              <a:t>		Oct 5</a:t>
+              <a:t>		Oct 15</a:t>
             </a:r>
             <a:r>
               <a:rPr lang="en-US" baseline="30000" dirty="0"/>
@@ -24911,7 +24910,15 @@
           <a:p>
             <a:r>
               <a:rPr lang="en-US" dirty="0"/>
-              <a:t>Reflection			Oct 12</a:t>
+              <a:t>Reflection			Oct 22</a:t>
+            </a:r>
+            <a:r>
+              <a:rPr lang="en-US" baseline="30000" dirty="0"/>
+              <a:t>nd</a:t>
+            </a:r>
+            <a:r>
+              <a:rPr lang="en-US" dirty="0"/>
+              <a:t> and 29</a:t>
             </a:r>
             <a:r>
               <a:rPr lang="en-US" baseline="30000" dirty="0"/>
@@ -24919,7 +24926,13 @@
             </a:r>
             <a:r>
               <a:rPr lang="en-US" dirty="0"/>
-              <a:t> and 19</a:t>
+              <a:t> </a:t>
+            </a:r>
+          </a:p>
+          <a:p>
+            <a:r>
+              <a:rPr lang="en-US" dirty="0"/>
+              <a:t>Lisp and Homoiconicity	Nov 5</a:t>
             </a:r>
             <a:r>
               <a:rPr lang="en-US" baseline="30000" dirty="0"/>
@@ -24927,13 +24940,21 @@
             </a:r>
             <a:r>
               <a:rPr lang="en-US" dirty="0"/>
+              <a:t> and 12</a:t>
+            </a:r>
+            <a:r>
+              <a:rPr lang="en-US" baseline="30000" dirty="0"/>
+              <a:t>nd</a:t>
+            </a:r>
+            <a:r>
+              <a:rPr lang="en-US" dirty="0"/>
               <a:t> </a:t>
             </a:r>
           </a:p>
           <a:p>
             <a:r>
               <a:rPr lang="en-US" dirty="0"/>
-              <a:t>Lisp and Homoiconicity	Oct 26</a:t>
+              <a:t>Compile-time Computation	Nov 19</a:t>
             </a:r>
             <a:r>
               <a:rPr lang="en-US" baseline="30000" dirty="0"/>
@@ -24941,11 +24962,17 @@
             </a:r>
             <a:r>
               <a:rPr lang="en-US" dirty="0"/>
-              <a:t> and Nov 2</a:t>
+              <a:t> </a:t>
+            </a:r>
+          </a:p>
+          <a:p>
+            <a:r>
+              <a:rPr lang="en-US" dirty="0"/>
+              <a:t>Programs writing Programs	Nov 26</a:t>
             </a:r>
             <a:r>
               <a:rPr lang="en-US" baseline="30000" dirty="0"/>
-              <a:t>nd</a:t>
+              <a:t>th</a:t>
             </a:r>
             <a:r>
               <a:rPr lang="en-US" dirty="0"/>
@@ -24955,39 +24982,11 @@
           <a:p>
             <a:r>
               <a:rPr lang="en-US" dirty="0"/>
-              <a:t>Compile-time Computation	Nov 9</a:t>
+              <a:t>Domain Specific Languages	Dec 3</a:t>
             </a:r>
             <a:r>
               <a:rPr lang="en-US" baseline="30000" dirty="0"/>
-              <a:t>th</a:t>
-            </a:r>
-            <a:r>
-              <a:rPr lang="en-US" dirty="0"/>
-              <a:t> </a:t>
-            </a:r>
-          </a:p>
-          <a:p>
-            <a:r>
-              <a:rPr lang="en-US" dirty="0"/>
-              <a:t>Programs writing Programs	Nov 16</a:t>
-            </a:r>
-            <a:r>
-              <a:rPr lang="en-US" baseline="30000" dirty="0"/>
-              <a:t>th</a:t>
-            </a:r>
-            <a:r>
-              <a:rPr lang="en-US" dirty="0"/>
-              <a:t> </a:t>
-            </a:r>
-          </a:p>
-          <a:p>
-            <a:r>
-              <a:rPr lang="en-US" dirty="0"/>
-              <a:t>Domain Specific Languages	Nov 30</a:t>
-            </a:r>
-            <a:r>
-              <a:rPr lang="en-US" baseline="30000" dirty="0"/>
-              <a:t>th</a:t>
+              <a:t>rd</a:t>
             </a:r>
             <a:r>
               <a:rPr lang="en-US" dirty="0"/>
@@ -26091,7 +26090,7 @@
             </a:r>
             <a:r>
               <a:rPr lang="en-US" dirty="0"/>
-              <a:t> (don’t spend more than an hour/week!)</a:t>
+              <a:t> </a:t>
             </a:r>
           </a:p>
           <a:p>
@@ -26404,7 +26403,7 @@
           <a:p>
             <a:r>
               <a:rPr lang="en-US" dirty="0"/>
-              <a:t>No cheating policy</a:t>
+              <a:t>Cheating Policy… Lack Of</a:t>
             </a:r>
           </a:p>
           <a:p>

</xml_diff>

<commit_message>
Fixed some animations etc
</commit_message>
<xml_diff>
--- a/slides/00-OOPython.pptx
+++ b/slides/00-OOPython.pptx
@@ -217,7 +217,7 @@
           <a:p>
             <a:fld id="{27CEEA13-23F5-194B-B1CF-CF175090CBFA}" type="datetimeFigureOut">
               <a:rPr lang="en-US" smtClean="0"/>
-              <a:t>8/13/18</a:t>
+              <a:t>9/1/18</a:t>
             </a:fld>
             <a:endParaRPr lang="en-US"/>
           </a:p>
@@ -1481,7 +1481,7 @@
           <a:p>
             <a:fld id="{2DD5D53E-635E-BD41-B5CC-A796D6DD661B}" type="datetimeFigureOut">
               <a:rPr lang="en-US" smtClean="0"/>
-              <a:t>8/13/18</a:t>
+              <a:t>9/1/18</a:t>
             </a:fld>
             <a:endParaRPr lang="en-US"/>
           </a:p>
@@ -1811,7 +1811,7 @@
           <a:p>
             <a:fld id="{2DD5D53E-635E-BD41-B5CC-A796D6DD661B}" type="datetimeFigureOut">
               <a:rPr lang="en-US" smtClean="0"/>
-              <a:t>8/13/18</a:t>
+              <a:t>9/1/18</a:t>
             </a:fld>
             <a:endParaRPr lang="en-US"/>
           </a:p>
@@ -1991,7 +1991,7 @@
           <a:p>
             <a:fld id="{2DD5D53E-635E-BD41-B5CC-A796D6DD661B}" type="datetimeFigureOut">
               <a:rPr lang="en-US" smtClean="0"/>
-              <a:t>8/13/18</a:t>
+              <a:t>9/1/18</a:t>
             </a:fld>
             <a:endParaRPr lang="en-US"/>
           </a:p>
@@ -2161,7 +2161,7 @@
           <a:p>
             <a:fld id="{2DD5D53E-635E-BD41-B5CC-A796D6DD661B}" type="datetimeFigureOut">
               <a:rPr lang="en-US" smtClean="0"/>
-              <a:t>8/13/18</a:t>
+              <a:t>9/1/18</a:t>
             </a:fld>
             <a:endParaRPr lang="en-US"/>
           </a:p>
@@ -2433,7 +2433,7 @@
           <a:p>
             <a:fld id="{2DD5D53E-635E-BD41-B5CC-A796D6DD661B}" type="datetimeFigureOut">
               <a:rPr lang="en-US" smtClean="0"/>
-              <a:t>8/13/18</a:t>
+              <a:t>9/1/18</a:t>
             </a:fld>
             <a:endParaRPr lang="en-US"/>
           </a:p>
@@ -2827,7 +2827,7 @@
           <a:p>
             <a:fld id="{2DD5D53E-635E-BD41-B5CC-A796D6DD661B}" type="datetimeFigureOut">
               <a:rPr lang="en-US" smtClean="0"/>
-              <a:t>8/13/18</a:t>
+              <a:t>9/1/18</a:t>
             </a:fld>
             <a:endParaRPr lang="en-US"/>
           </a:p>
@@ -3304,7 +3304,7 @@
           <a:p>
             <a:fld id="{2DD5D53E-635E-BD41-B5CC-A796D6DD661B}" type="datetimeFigureOut">
               <a:rPr lang="en-US" smtClean="0"/>
-              <a:t>8/13/18</a:t>
+              <a:t>9/1/18</a:t>
             </a:fld>
             <a:endParaRPr lang="en-US"/>
           </a:p>
@@ -3422,7 +3422,7 @@
           <a:p>
             <a:fld id="{2DD5D53E-635E-BD41-B5CC-A796D6DD661B}" type="datetimeFigureOut">
               <a:rPr lang="en-US" smtClean="0"/>
-              <a:t>8/13/18</a:t>
+              <a:t>9/1/18</a:t>
             </a:fld>
             <a:endParaRPr lang="en-US"/>
           </a:p>
@@ -3517,7 +3517,7 @@
           <a:p>
             <a:fld id="{2DD5D53E-635E-BD41-B5CC-A796D6DD661B}" type="datetimeFigureOut">
               <a:rPr lang="en-US" smtClean="0"/>
-              <a:t>8/13/18</a:t>
+              <a:t>9/1/18</a:t>
             </a:fld>
             <a:endParaRPr lang="en-US"/>
           </a:p>
@@ -3863,7 +3863,7 @@
           <a:p>
             <a:fld id="{2DD5D53E-635E-BD41-B5CC-A796D6DD661B}" type="datetimeFigureOut">
               <a:rPr lang="en-US" smtClean="0"/>
-              <a:t>8/13/18</a:t>
+              <a:t>9/1/18</a:t>
             </a:fld>
             <a:endParaRPr lang="en-US"/>
           </a:p>
@@ -4251,7 +4251,7 @@
           <a:p>
             <a:fld id="{2DD5D53E-635E-BD41-B5CC-A796D6DD661B}" type="datetimeFigureOut">
               <a:rPr lang="en-US" smtClean="0"/>
-              <a:t>8/13/18</a:t>
+              <a:t>9/1/18</a:t>
             </a:fld>
             <a:endParaRPr lang="en-US"/>
           </a:p>
@@ -4526,7 +4526,7 @@
           <a:p>
             <a:fld id="{2DD5D53E-635E-BD41-B5CC-A796D6DD661B}" type="datetimeFigureOut">
               <a:rPr lang="en-US" smtClean="0"/>
-              <a:t>8/13/18</a:t>
+              <a:t>9/1/18</a:t>
             </a:fld>
             <a:endParaRPr lang="en-US"/>
           </a:p>
@@ -7322,6 +7322,33 @@
                                   </p:childTnLst>
                                 </p:cTn>
                               </p:par>
+                              <p:par>
+                                <p:cTn id="100" presetID="1" presetClass="entr" presetSubtype="0" fill="hold" grpId="0" nodeType="withEffect">
+                                  <p:stCondLst>
+                                    <p:cond delay="0"/>
+                                  </p:stCondLst>
+                                  <p:childTnLst>
+                                    <p:set>
+                                      <p:cBhvr>
+                                        <p:cTn id="101" dur="1" fill="hold">
+                                          <p:stCondLst>
+                                            <p:cond delay="0"/>
+                                          </p:stCondLst>
+                                        </p:cTn>
+                                        <p:tgtEl>
+                                          <p:spTgt spid="5"/>
+                                        </p:tgtEl>
+                                        <p:attrNameLst>
+                                          <p:attrName>style.visibility</p:attrName>
+                                        </p:attrNameLst>
+                                      </p:cBhvr>
+                                      <p:to>
+                                        <p:strVal val="visible"/>
+                                      </p:to>
+                                    </p:set>
+                                  </p:childTnLst>
+                                </p:cTn>
+                              </p:par>
                             </p:childTnLst>
                           </p:cTn>
                         </p:par>
@@ -7352,6 +7379,7 @@
     <p:bldLst>
       <p:bldP spid="3" grpId="0" build="p"/>
       <p:bldP spid="4" grpId="0" uiExpand="1" build="p" animBg="1"/>
+      <p:bldP spid="5" grpId="0"/>
     </p:bldLst>
   </p:timing>
 </p:sld>
@@ -9876,7 +9904,13 @@
           <a:p>
             <a:r>
               <a:rPr lang="en-US" sz="1800" dirty="0"/>
-              <a:t>However, this is not “Pythonic”</a:t>
+              <a:t>Program Still Crashes</a:t>
+            </a:r>
+          </a:p>
+          <a:p>
+            <a:r>
+              <a:rPr lang="en-US" sz="1800" dirty="0"/>
+              <a:t>Also, this is not “Pythonic”</a:t>
             </a:r>
           </a:p>
           <a:p>
@@ -11021,15 +11055,33 @@
                                   </p:childTnLst>
                                 </p:cTn>
                               </p:par>
+                            </p:childTnLst>
+                          </p:cTn>
+                        </p:par>
+                      </p:childTnLst>
+                    </p:cTn>
+                  </p:par>
+                  <p:par>
+                    <p:cTn id="15" fill="hold">
+                      <p:stCondLst>
+                        <p:cond delay="indefinite"/>
+                      </p:stCondLst>
+                      <p:childTnLst>
+                        <p:par>
+                          <p:cTn id="16" fill="hold">
+                            <p:stCondLst>
+                              <p:cond delay="0"/>
+                            </p:stCondLst>
+                            <p:childTnLst>
                               <p:par>
-                                <p:cTn id="15" presetID="2" presetClass="entr" presetSubtype="4" fill="hold" grpId="0" nodeType="withEffect">
+                                <p:cTn id="17" presetID="2" presetClass="entr" presetSubtype="4" fill="hold" grpId="0" nodeType="clickEffect">
                                   <p:stCondLst>
                                     <p:cond delay="0"/>
                                   </p:stCondLst>
                                   <p:childTnLst>
                                     <p:set>
                                       <p:cBhvr>
-                                        <p:cTn id="16" dur="1" fill="hold">
+                                        <p:cTn id="18" dur="1" fill="hold">
                                           <p:stCondLst>
                                             <p:cond delay="0"/>
                                           </p:stCondLst>
@@ -11051,7 +11103,7 @@
                                     </p:set>
                                     <p:anim calcmode="lin" valueType="num">
                                       <p:cBhvr additive="base">
-                                        <p:cTn id="17" dur="500" fill="hold"/>
+                                        <p:cTn id="19" dur="500" fill="hold"/>
                                         <p:tgtEl>
                                           <p:spTgt spid="3">
                                             <p:txEl>
@@ -11078,11 +11130,96 @@
                                     </p:anim>
                                     <p:anim calcmode="lin" valueType="num">
                                       <p:cBhvr additive="base">
-                                        <p:cTn id="18" dur="500" fill="hold"/>
+                                        <p:cTn id="20" dur="500" fill="hold"/>
                                         <p:tgtEl>
                                           <p:spTgt spid="3">
                                             <p:txEl>
                                               <p:pRg st="2" end="2"/>
+                                            </p:txEl>
+                                          </p:spTgt>
+                                        </p:tgtEl>
+                                        <p:attrNameLst>
+                                          <p:attrName>ppt_y</p:attrName>
+                                        </p:attrNameLst>
+                                      </p:cBhvr>
+                                      <p:tavLst>
+                                        <p:tav tm="0">
+                                          <p:val>
+                                            <p:strVal val="1+#ppt_h/2"/>
+                                          </p:val>
+                                        </p:tav>
+                                        <p:tav tm="100000">
+                                          <p:val>
+                                            <p:strVal val="#ppt_y"/>
+                                          </p:val>
+                                        </p:tav>
+                                      </p:tavLst>
+                                    </p:anim>
+                                  </p:childTnLst>
+                                </p:cTn>
+                              </p:par>
+                              <p:par>
+                                <p:cTn id="21" presetID="2" presetClass="entr" presetSubtype="4" fill="hold" grpId="0" nodeType="withEffect">
+                                  <p:stCondLst>
+                                    <p:cond delay="0"/>
+                                  </p:stCondLst>
+                                  <p:childTnLst>
+                                    <p:set>
+                                      <p:cBhvr>
+                                        <p:cTn id="22" dur="1" fill="hold">
+                                          <p:stCondLst>
+                                            <p:cond delay="0"/>
+                                          </p:stCondLst>
+                                        </p:cTn>
+                                        <p:tgtEl>
+                                          <p:spTgt spid="3">
+                                            <p:txEl>
+                                              <p:pRg st="3" end="3"/>
+                                            </p:txEl>
+                                          </p:spTgt>
+                                        </p:tgtEl>
+                                        <p:attrNameLst>
+                                          <p:attrName>style.visibility</p:attrName>
+                                        </p:attrNameLst>
+                                      </p:cBhvr>
+                                      <p:to>
+                                        <p:strVal val="visible"/>
+                                      </p:to>
+                                    </p:set>
+                                    <p:anim calcmode="lin" valueType="num">
+                                      <p:cBhvr additive="base">
+                                        <p:cTn id="23" dur="500" fill="hold"/>
+                                        <p:tgtEl>
+                                          <p:spTgt spid="3">
+                                            <p:txEl>
+                                              <p:pRg st="3" end="3"/>
+                                            </p:txEl>
+                                          </p:spTgt>
+                                        </p:tgtEl>
+                                        <p:attrNameLst>
+                                          <p:attrName>ppt_x</p:attrName>
+                                        </p:attrNameLst>
+                                      </p:cBhvr>
+                                      <p:tavLst>
+                                        <p:tav tm="0">
+                                          <p:val>
+                                            <p:strVal val="#ppt_x"/>
+                                          </p:val>
+                                        </p:tav>
+                                        <p:tav tm="100000">
+                                          <p:val>
+                                            <p:strVal val="#ppt_x"/>
+                                          </p:val>
+                                        </p:tav>
+                                      </p:tavLst>
+                                    </p:anim>
+                                    <p:anim calcmode="lin" valueType="num">
+                                      <p:cBhvr additive="base">
+                                        <p:cTn id="24" dur="500" fill="hold"/>
+                                        <p:tgtEl>
+                                          <p:spTgt spid="3">
+                                            <p:txEl>
+                                              <p:pRg st="3" end="3"/>
                                             </p:txEl>
                                           </p:spTgt>
                                         </p:tgtEl>
@@ -11113,26 +11250,26 @@
                     </p:cTn>
                   </p:par>
                   <p:par>
-                    <p:cTn id="19" fill="hold">
+                    <p:cTn id="25" fill="hold">
                       <p:stCondLst>
                         <p:cond delay="indefinite"/>
                       </p:stCondLst>
                       <p:childTnLst>
                         <p:par>
-                          <p:cTn id="20" fill="hold">
+                          <p:cTn id="26" fill="hold">
                             <p:stCondLst>
                               <p:cond delay="0"/>
                             </p:stCondLst>
                             <p:childTnLst>
                               <p:par>
-                                <p:cTn id="21" presetID="2" presetClass="entr" presetSubtype="4" fill="hold" grpId="0" nodeType="clickEffect">
+                                <p:cTn id="27" presetID="2" presetClass="entr" presetSubtype="4" fill="hold" grpId="0" nodeType="clickEffect">
                                   <p:stCondLst>
                                     <p:cond delay="0"/>
                                   </p:stCondLst>
                                   <p:childTnLst>
                                     <p:set>
                                       <p:cBhvr>
-                                        <p:cTn id="22" dur="1" fill="hold">
+                                        <p:cTn id="28" dur="1" fill="hold">
                                           <p:stCondLst>
                                             <p:cond delay="0"/>
                                           </p:stCondLst>
@@ -11140,7 +11277,7 @@
                                         <p:tgtEl>
                                           <p:spTgt spid="3">
                                             <p:txEl>
-                                              <p:pRg st="3" end="3"/>
+                                              <p:pRg st="4" end="4"/>
                                             </p:txEl>
                                           </p:spTgt>
                                         </p:tgtEl>
@@ -11154,11 +11291,11 @@
                                     </p:set>
                                     <p:anim calcmode="lin" valueType="num">
                                       <p:cBhvr additive="base">
-                                        <p:cTn id="23" dur="500" fill="hold"/>
+                                        <p:cTn id="29" dur="500" fill="hold"/>
                                         <p:tgtEl>
                                           <p:spTgt spid="3">
                                             <p:txEl>
-                                              <p:pRg st="3" end="3"/>
+                                              <p:pRg st="4" end="4"/>
                                             </p:txEl>
                                           </p:spTgt>
                                         </p:tgtEl>
@@ -11181,11 +11318,11 @@
                                     </p:anim>
                                     <p:anim calcmode="lin" valueType="num">
                                       <p:cBhvr additive="base">
-                                        <p:cTn id="24" dur="500" fill="hold"/>
+                                        <p:cTn id="30" dur="500" fill="hold"/>
                                         <p:tgtEl>
                                           <p:spTgt spid="3">
                                             <p:txEl>
-                                              <p:pRg st="3" end="3"/>
+                                              <p:pRg st="4" end="4"/>
                                             </p:txEl>
                                           </p:spTgt>
                                         </p:tgtEl>
@@ -11210,14 +11347,14 @@
                                 </p:cTn>
                               </p:par>
                               <p:par>
-                                <p:cTn id="25" presetID="2" presetClass="entr" presetSubtype="4" fill="hold" grpId="0" nodeType="withEffect">
+                                <p:cTn id="31" presetID="2" presetClass="entr" presetSubtype="4" fill="hold" grpId="0" nodeType="withEffect">
                                   <p:stCondLst>
                                     <p:cond delay="0"/>
                                   </p:stCondLst>
                                   <p:childTnLst>
                                     <p:set>
                                       <p:cBhvr>
-                                        <p:cTn id="26" dur="1" fill="hold">
+                                        <p:cTn id="32" dur="1" fill="hold">
                                           <p:stCondLst>
                                             <p:cond delay="0"/>
                                           </p:stCondLst>
@@ -11225,7 +11362,7 @@
                                         <p:tgtEl>
                                           <p:spTgt spid="3">
                                             <p:txEl>
-                                              <p:pRg st="4" end="4"/>
+                                              <p:pRg st="5" end="5"/>
                                             </p:txEl>
                                           </p:spTgt>
                                         </p:tgtEl>
@@ -11239,11 +11376,11 @@
                                     </p:set>
                                     <p:anim calcmode="lin" valueType="num">
                                       <p:cBhvr additive="base">
-                                        <p:cTn id="27" dur="500" fill="hold"/>
+                                        <p:cTn id="33" dur="500" fill="hold"/>
                                         <p:tgtEl>
                                           <p:spTgt spid="3">
                                             <p:txEl>
-                                              <p:pRg st="4" end="4"/>
+                                              <p:pRg st="5" end="5"/>
                                             </p:txEl>
                                           </p:spTgt>
                                         </p:tgtEl>
@@ -11266,11 +11403,11 @@
                                     </p:anim>
                                     <p:anim calcmode="lin" valueType="num">
                                       <p:cBhvr additive="base">
-                                        <p:cTn id="28" dur="500" fill="hold"/>
+                                        <p:cTn id="34" dur="500" fill="hold"/>
                                         <p:tgtEl>
                                           <p:spTgt spid="3">
                                             <p:txEl>
-                                              <p:pRg st="4" end="4"/>
+                                              <p:pRg st="5" end="5"/>
                                             </p:txEl>
                                           </p:spTgt>
                                         </p:tgtEl>
@@ -11301,26 +11438,26 @@
                     </p:cTn>
                   </p:par>
                   <p:par>
-                    <p:cTn id="29" fill="hold">
+                    <p:cTn id="35" fill="hold">
                       <p:stCondLst>
                         <p:cond delay="indefinite"/>
                       </p:stCondLst>
                       <p:childTnLst>
                         <p:par>
-                          <p:cTn id="30" fill="hold">
+                          <p:cTn id="36" fill="hold">
                             <p:stCondLst>
                               <p:cond delay="0"/>
                             </p:stCondLst>
                             <p:childTnLst>
                               <p:par>
-                                <p:cTn id="31" presetID="1" presetClass="entr" presetSubtype="0" fill="hold" grpId="0" nodeType="clickEffect">
+                                <p:cTn id="37" presetID="1" presetClass="entr" presetSubtype="0" fill="hold" grpId="0" nodeType="clickEffect">
                                   <p:stCondLst>
                                     <p:cond delay="0"/>
                                   </p:stCondLst>
                                   <p:childTnLst>
                                     <p:set>
                                       <p:cBhvr>
-                                        <p:cTn id="32" dur="1" fill="hold">
+                                        <p:cTn id="38" dur="1" fill="hold">
                                           <p:stCondLst>
                                             <p:cond delay="0"/>
                                           </p:stCondLst>
@@ -11348,26 +11485,26 @@
                     </p:cTn>
                   </p:par>
                   <p:par>
-                    <p:cTn id="33" fill="hold">
+                    <p:cTn id="39" fill="hold">
                       <p:stCondLst>
                         <p:cond delay="indefinite"/>
                       </p:stCondLst>
                       <p:childTnLst>
                         <p:par>
-                          <p:cTn id="34" fill="hold">
+                          <p:cTn id="40" fill="hold">
                             <p:stCondLst>
                               <p:cond delay="0"/>
                             </p:stCondLst>
                             <p:childTnLst>
                               <p:par>
-                                <p:cTn id="35" presetID="22" presetClass="entr" presetSubtype="8" fill="hold" grpId="0" nodeType="clickEffect">
+                                <p:cTn id="41" presetID="22" presetClass="entr" presetSubtype="8" fill="hold" grpId="0" nodeType="clickEffect">
                                   <p:stCondLst>
                                     <p:cond delay="0"/>
                                   </p:stCondLst>
                                   <p:childTnLst>
                                     <p:set>
                                       <p:cBhvr>
-                                        <p:cTn id="36" dur="1" fill="hold">
+                                        <p:cTn id="42" dur="1" fill="hold">
                                           <p:stCondLst>
                                             <p:cond delay="0"/>
                                           </p:stCondLst>
@@ -11389,7 +11526,7 @@
                                     </p:set>
                                     <p:animEffect transition="in" filter="wipe(left)">
                                       <p:cBhvr>
-                                        <p:cTn id="37" dur="500"/>
+                                        <p:cTn id="43" dur="500"/>
                                         <p:tgtEl>
                                           <p:spTgt spid="4">
                                             <p:txEl>
@@ -11409,26 +11546,26 @@
                     </p:cTn>
                   </p:par>
                   <p:par>
-                    <p:cTn id="38" fill="hold">
+                    <p:cTn id="44" fill="hold">
                       <p:stCondLst>
                         <p:cond delay="indefinite"/>
                       </p:stCondLst>
                       <p:childTnLst>
                         <p:par>
-                          <p:cTn id="39" fill="hold">
+                          <p:cTn id="45" fill="hold">
                             <p:stCondLst>
                               <p:cond delay="0"/>
                             </p:stCondLst>
                             <p:childTnLst>
                               <p:par>
-                                <p:cTn id="40" presetID="22" presetClass="entr" presetSubtype="8" fill="hold" grpId="0" nodeType="clickEffect">
+                                <p:cTn id="46" presetID="22" presetClass="entr" presetSubtype="8" fill="hold" grpId="0" nodeType="clickEffect">
                                   <p:stCondLst>
                                     <p:cond delay="0"/>
                                   </p:stCondLst>
                                   <p:childTnLst>
                                     <p:set>
                                       <p:cBhvr>
-                                        <p:cTn id="41" dur="1" fill="hold">
+                                        <p:cTn id="47" dur="1" fill="hold">
                                           <p:stCondLst>
                                             <p:cond delay="0"/>
                                           </p:stCondLst>
@@ -11450,7 +11587,7 @@
                                     </p:set>
                                     <p:animEffect transition="in" filter="wipe(left)">
                                       <p:cBhvr>
-                                        <p:cTn id="42" dur="500"/>
+                                        <p:cTn id="48" dur="500"/>
                                         <p:tgtEl>
                                           <p:spTgt spid="4">
                                             <p:txEl>
@@ -11470,26 +11607,26 @@
                     </p:cTn>
                   </p:par>
                   <p:par>
-                    <p:cTn id="43" fill="hold">
+                    <p:cTn id="49" fill="hold">
                       <p:stCondLst>
                         <p:cond delay="indefinite"/>
                       </p:stCondLst>
                       <p:childTnLst>
                         <p:par>
-                          <p:cTn id="44" fill="hold">
+                          <p:cTn id="50" fill="hold">
                             <p:stCondLst>
                               <p:cond delay="0"/>
                             </p:stCondLst>
                             <p:childTnLst>
                               <p:par>
-                                <p:cTn id="45" presetID="22" presetClass="entr" presetSubtype="8" fill="hold" grpId="0" nodeType="clickEffect">
+                                <p:cTn id="51" presetID="22" presetClass="entr" presetSubtype="8" fill="hold" grpId="0" nodeType="clickEffect">
                                   <p:stCondLst>
                                     <p:cond delay="0"/>
                                   </p:stCondLst>
                                   <p:childTnLst>
                                     <p:set>
                                       <p:cBhvr>
-                                        <p:cTn id="46" dur="1" fill="hold">
+                                        <p:cTn id="52" dur="1" fill="hold">
                                           <p:stCondLst>
                                             <p:cond delay="0"/>
                                           </p:stCondLst>
@@ -11511,7 +11648,7 @@
                                     </p:set>
                                     <p:animEffect transition="in" filter="wipe(left)">
                                       <p:cBhvr>
-                                        <p:cTn id="47" dur="500"/>
+                                        <p:cTn id="53" dur="500"/>
                                         <p:tgtEl>
                                           <p:spTgt spid="4">
                                             <p:txEl>
@@ -11531,26 +11668,26 @@
                     </p:cTn>
                   </p:par>
                   <p:par>
-                    <p:cTn id="48" fill="hold">
+                    <p:cTn id="54" fill="hold">
                       <p:stCondLst>
                         <p:cond delay="indefinite"/>
                       </p:stCondLst>
                       <p:childTnLst>
                         <p:par>
-                          <p:cTn id="49" fill="hold">
+                          <p:cTn id="55" fill="hold">
                             <p:stCondLst>
                               <p:cond delay="0"/>
                             </p:stCondLst>
                             <p:childTnLst>
                               <p:par>
-                                <p:cTn id="50" presetID="22" presetClass="entr" presetSubtype="8" fill="hold" grpId="0" nodeType="clickEffect">
+                                <p:cTn id="56" presetID="22" presetClass="entr" presetSubtype="8" fill="hold" grpId="0" nodeType="clickEffect">
                                   <p:stCondLst>
                                     <p:cond delay="0"/>
                                   </p:stCondLst>
                                   <p:childTnLst>
                                     <p:set>
                                       <p:cBhvr>
-                                        <p:cTn id="51" dur="1" fill="hold">
+                                        <p:cTn id="57" dur="1" fill="hold">
                                           <p:stCondLst>
                                             <p:cond delay="0"/>
                                           </p:stCondLst>
@@ -11572,7 +11709,7 @@
                                     </p:set>
                                     <p:animEffect transition="in" filter="wipe(left)">
                                       <p:cBhvr>
-                                        <p:cTn id="52" dur="500"/>
+                                        <p:cTn id="58" dur="500"/>
                                         <p:tgtEl>
                                           <p:spTgt spid="4">
                                             <p:txEl>
@@ -11592,26 +11729,26 @@
                     </p:cTn>
                   </p:par>
                   <p:par>
-                    <p:cTn id="53" fill="hold">
+                    <p:cTn id="59" fill="hold">
                       <p:stCondLst>
                         <p:cond delay="indefinite"/>
                       </p:stCondLst>
                       <p:childTnLst>
                         <p:par>
-                          <p:cTn id="54" fill="hold">
+                          <p:cTn id="60" fill="hold">
                             <p:stCondLst>
                               <p:cond delay="0"/>
                             </p:stCondLst>
                             <p:childTnLst>
                               <p:par>
-                                <p:cTn id="55" presetID="22" presetClass="entr" presetSubtype="8" fill="hold" grpId="0" nodeType="clickEffect">
+                                <p:cTn id="61" presetID="22" presetClass="entr" presetSubtype="8" fill="hold" grpId="0" nodeType="clickEffect">
                                   <p:stCondLst>
                                     <p:cond delay="0"/>
                                   </p:stCondLst>
                                   <p:childTnLst>
                                     <p:set>
                                       <p:cBhvr>
-                                        <p:cTn id="56" dur="1" fill="hold">
+                                        <p:cTn id="62" dur="1" fill="hold">
                                           <p:stCondLst>
                                             <p:cond delay="0"/>
                                           </p:stCondLst>
@@ -11633,97 +11770,11 @@
                                     </p:set>
                                     <p:animEffect transition="in" filter="wipe(left)">
                                       <p:cBhvr>
-                                        <p:cTn id="57" dur="500"/>
+                                        <p:cTn id="63" dur="500"/>
                                         <p:tgtEl>
                                           <p:spTgt spid="4">
                                             <p:txEl>
                                               <p:pRg st="4" end="4"/>
-                                            </p:txEl>
-                                          </p:spTgt>
-                                        </p:tgtEl>
-                                      </p:cBhvr>
-                                    </p:animEffect>
-                                  </p:childTnLst>
-                                </p:cTn>
-                              </p:par>
-                              <p:par>
-                                <p:cTn id="58" presetID="22" presetClass="entr" presetSubtype="8" fill="hold" grpId="0" nodeType="withEffect">
-                                  <p:stCondLst>
-                                    <p:cond delay="0"/>
-                                  </p:stCondLst>
-                                  <p:childTnLst>
-                                    <p:set>
-                                      <p:cBhvr>
-                                        <p:cTn id="59" dur="1" fill="hold">
-                                          <p:stCondLst>
-                                            <p:cond delay="0"/>
-                                          </p:stCondLst>
-                                        </p:cTn>
-                                        <p:tgtEl>
-                                          <p:spTgt spid="4">
-                                            <p:txEl>
-                                              <p:pRg st="5" end="5"/>
-                                            </p:txEl>
-                                          </p:spTgt>
-                                        </p:tgtEl>
-                                        <p:attrNameLst>
-                                          <p:attrName>style.visibility</p:attrName>
-                                        </p:attrNameLst>
-                                      </p:cBhvr>
-                                      <p:to>
-                                        <p:strVal val="visible"/>
-                                      </p:to>
-                                    </p:set>
-                                    <p:animEffect transition="in" filter="wipe(left)">
-                                      <p:cBhvr>
-                                        <p:cTn id="60" dur="500"/>
-                                        <p:tgtEl>
-                                          <p:spTgt spid="4">
-                                            <p:txEl>
-                                              <p:pRg st="5" end="5"/>
-                                            </p:txEl>
-                                          </p:spTgt>
-                                        </p:tgtEl>
-                                      </p:cBhvr>
-                                    </p:animEffect>
-                                  </p:childTnLst>
-                                </p:cTn>
-                              </p:par>
-                              <p:par>
-                                <p:cTn id="61" presetID="22" presetClass="entr" presetSubtype="8" fill="hold" grpId="0" nodeType="withEffect">
-                                  <p:stCondLst>
-                                    <p:cond delay="0"/>
-                                  </p:stCondLst>
-                                  <p:childTnLst>
-                                    <p:set>
-                                      <p:cBhvr>
-                                        <p:cTn id="62" dur="1" fill="hold">
-                                          <p:stCondLst>
-                                            <p:cond delay="0"/>
-                                          </p:stCondLst>
-                                        </p:cTn>
-                                        <p:tgtEl>
-                                          <p:spTgt spid="4">
-                                            <p:txEl>
-                                              <p:pRg st="6" end="6"/>
-                                            </p:txEl>
-                                          </p:spTgt>
-                                        </p:tgtEl>
-                                        <p:attrNameLst>
-                                          <p:attrName>style.visibility</p:attrName>
-                                        </p:attrNameLst>
-                                      </p:cBhvr>
-                                      <p:to>
-                                        <p:strVal val="visible"/>
-                                      </p:to>
-                                    </p:set>
-                                    <p:animEffect transition="in" filter="wipe(left)">
-                                      <p:cBhvr>
-                                        <p:cTn id="63" dur="500"/>
-                                        <p:tgtEl>
-                                          <p:spTgt spid="4">
-                                            <p:txEl>
-                                              <p:pRg st="6" end="6"/>
                                             </p:txEl>
                                           </p:spTgt>
                                         </p:tgtEl>
@@ -11748,7 +11799,7 @@
                                         <p:tgtEl>
                                           <p:spTgt spid="4">
                                             <p:txEl>
-                                              <p:pRg st="7" end="7"/>
+                                              <p:pRg st="5" end="5"/>
                                             </p:txEl>
                                           </p:spTgt>
                                         </p:tgtEl>
@@ -11763,6 +11814,92 @@
                                     <p:animEffect transition="in" filter="wipe(left)">
                                       <p:cBhvr>
                                         <p:cTn id="66" dur="500"/>
+                                        <p:tgtEl>
+                                          <p:spTgt spid="4">
+                                            <p:txEl>
+                                              <p:pRg st="5" end="5"/>
+                                            </p:txEl>
+                                          </p:spTgt>
+                                        </p:tgtEl>
+                                      </p:cBhvr>
+                                    </p:animEffect>
+                                  </p:childTnLst>
+                                </p:cTn>
+                              </p:par>
+                              <p:par>
+                                <p:cTn id="67" presetID="22" presetClass="entr" presetSubtype="8" fill="hold" grpId="0" nodeType="withEffect">
+                                  <p:stCondLst>
+                                    <p:cond delay="0"/>
+                                  </p:stCondLst>
+                                  <p:childTnLst>
+                                    <p:set>
+                                      <p:cBhvr>
+                                        <p:cTn id="68" dur="1" fill="hold">
+                                          <p:stCondLst>
+                                            <p:cond delay="0"/>
+                                          </p:stCondLst>
+                                        </p:cTn>
+                                        <p:tgtEl>
+                                          <p:spTgt spid="4">
+                                            <p:txEl>
+                                              <p:pRg st="6" end="6"/>
+                                            </p:txEl>
+                                          </p:spTgt>
+                                        </p:tgtEl>
+                                        <p:attrNameLst>
+                                          <p:attrName>style.visibility</p:attrName>
+                                        </p:attrNameLst>
+                                      </p:cBhvr>
+                                      <p:to>
+                                        <p:strVal val="visible"/>
+                                      </p:to>
+                                    </p:set>
+                                    <p:animEffect transition="in" filter="wipe(left)">
+                                      <p:cBhvr>
+                                        <p:cTn id="69" dur="500"/>
+                                        <p:tgtEl>
+                                          <p:spTgt spid="4">
+                                            <p:txEl>
+                                              <p:pRg st="6" end="6"/>
+                                            </p:txEl>
+                                          </p:spTgt>
+                                        </p:tgtEl>
+                                      </p:cBhvr>
+                                    </p:animEffect>
+                                  </p:childTnLst>
+                                </p:cTn>
+                              </p:par>
+                              <p:par>
+                                <p:cTn id="70" presetID="22" presetClass="entr" presetSubtype="8" fill="hold" grpId="0" nodeType="withEffect">
+                                  <p:stCondLst>
+                                    <p:cond delay="0"/>
+                                  </p:stCondLst>
+                                  <p:childTnLst>
+                                    <p:set>
+                                      <p:cBhvr>
+                                        <p:cTn id="71" dur="1" fill="hold">
+                                          <p:stCondLst>
+                                            <p:cond delay="0"/>
+                                          </p:stCondLst>
+                                        </p:cTn>
+                                        <p:tgtEl>
+                                          <p:spTgt spid="4">
+                                            <p:txEl>
+                                              <p:pRg st="7" end="7"/>
+                                            </p:txEl>
+                                          </p:spTgt>
+                                        </p:tgtEl>
+                                        <p:attrNameLst>
+                                          <p:attrName>style.visibility</p:attrName>
+                                        </p:attrNameLst>
+                                      </p:cBhvr>
+                                      <p:to>
+                                        <p:strVal val="visible"/>
+                                      </p:to>
+                                    </p:set>
+                                    <p:animEffect transition="in" filter="wipe(left)">
+                                      <p:cBhvr>
+                                        <p:cTn id="72" dur="500"/>
                                         <p:tgtEl>
                                           <p:spTgt spid="4">
                                             <p:txEl>
@@ -11782,26 +11919,26 @@
                     </p:cTn>
                   </p:par>
                   <p:par>
-                    <p:cTn id="67" fill="hold">
+                    <p:cTn id="73" fill="hold">
                       <p:stCondLst>
                         <p:cond delay="indefinite"/>
                       </p:stCondLst>
                       <p:childTnLst>
                         <p:par>
-                          <p:cTn id="68" fill="hold">
+                          <p:cTn id="74" fill="hold">
                             <p:stCondLst>
                               <p:cond delay="0"/>
                             </p:stCondLst>
                             <p:childTnLst>
                               <p:par>
-                                <p:cTn id="69" presetID="22" presetClass="entr" presetSubtype="8" fill="hold" grpId="0" nodeType="clickEffect">
+                                <p:cTn id="75" presetID="22" presetClass="entr" presetSubtype="8" fill="hold" grpId="0" nodeType="clickEffect">
                                   <p:stCondLst>
                                     <p:cond delay="0"/>
                                   </p:stCondLst>
                                   <p:childTnLst>
                                     <p:set>
                                       <p:cBhvr>
-                                        <p:cTn id="70" dur="1" fill="hold">
+                                        <p:cTn id="76" dur="1" fill="hold">
                                           <p:stCondLst>
                                             <p:cond delay="0"/>
                                           </p:stCondLst>
@@ -11823,7 +11960,7 @@
                                     </p:set>
                                     <p:animEffect transition="in" filter="wipe(left)">
                                       <p:cBhvr>
-                                        <p:cTn id="71" dur="500"/>
+                                        <p:cTn id="77" dur="500"/>
                                         <p:tgtEl>
                                           <p:spTgt spid="4">
                                             <p:txEl>
@@ -11843,26 +11980,26 @@
                     </p:cTn>
                   </p:par>
                   <p:par>
-                    <p:cTn id="72" fill="hold">
+                    <p:cTn id="78" fill="hold">
                       <p:stCondLst>
                         <p:cond delay="indefinite"/>
                       </p:stCondLst>
                       <p:childTnLst>
                         <p:par>
-                          <p:cTn id="73" fill="hold">
+                          <p:cTn id="79" fill="hold">
                             <p:stCondLst>
                               <p:cond delay="0"/>
                             </p:stCondLst>
                             <p:childTnLst>
                               <p:par>
-                                <p:cTn id="74" presetID="22" presetClass="entr" presetSubtype="8" fill="hold" grpId="0" nodeType="clickEffect">
+                                <p:cTn id="80" presetID="22" presetClass="entr" presetSubtype="8" fill="hold" grpId="0" nodeType="clickEffect">
                                   <p:stCondLst>
                                     <p:cond delay="0"/>
                                   </p:stCondLst>
                                   <p:childTnLst>
                                     <p:set>
                                       <p:cBhvr>
-                                        <p:cTn id="75" dur="1" fill="hold">
+                                        <p:cTn id="81" dur="1" fill="hold">
                                           <p:stCondLst>
                                             <p:cond delay="0"/>
                                           </p:stCondLst>
@@ -11884,7 +12021,7 @@
                                     </p:set>
                                     <p:animEffect transition="in" filter="wipe(left)">
                                       <p:cBhvr>
-                                        <p:cTn id="76" dur="500"/>
+                                        <p:cTn id="82" dur="500"/>
                                         <p:tgtEl>
                                           <p:spTgt spid="4">
                                             <p:txEl>
@@ -11904,26 +12041,26 @@
                     </p:cTn>
                   </p:par>
                   <p:par>
-                    <p:cTn id="77" fill="hold">
+                    <p:cTn id="83" fill="hold">
                       <p:stCondLst>
                         <p:cond delay="indefinite"/>
                       </p:stCondLst>
                       <p:childTnLst>
                         <p:par>
-                          <p:cTn id="78" fill="hold">
+                          <p:cTn id="84" fill="hold">
                             <p:stCondLst>
                               <p:cond delay="0"/>
                             </p:stCondLst>
                             <p:childTnLst>
                               <p:par>
-                                <p:cTn id="79" presetID="22" presetClass="entr" presetSubtype="8" fill="hold" grpId="0" nodeType="clickEffect">
+                                <p:cTn id="85" presetID="22" presetClass="entr" presetSubtype="8" fill="hold" grpId="0" nodeType="clickEffect">
                                   <p:stCondLst>
                                     <p:cond delay="0"/>
                                   </p:stCondLst>
                                   <p:childTnLst>
                                     <p:set>
                                       <p:cBhvr>
-                                        <p:cTn id="80" dur="1" fill="hold">
+                                        <p:cTn id="86" dur="1" fill="hold">
                                           <p:stCondLst>
                                             <p:cond delay="0"/>
                                           </p:stCondLst>
@@ -11945,7 +12082,7 @@
                                     </p:set>
                                     <p:animEffect transition="in" filter="wipe(left)">
                                       <p:cBhvr>
-                                        <p:cTn id="81" dur="500"/>
+                                        <p:cTn id="87" dur="500"/>
                                         <p:tgtEl>
                                           <p:spTgt spid="4">
                                             <p:txEl>
@@ -11965,26 +12102,26 @@
                     </p:cTn>
                   </p:par>
                   <p:par>
-                    <p:cTn id="82" fill="hold">
+                    <p:cTn id="88" fill="hold">
                       <p:stCondLst>
                         <p:cond delay="indefinite"/>
                       </p:stCondLst>
                       <p:childTnLst>
                         <p:par>
-                          <p:cTn id="83" fill="hold">
+                          <p:cTn id="89" fill="hold">
                             <p:stCondLst>
                               <p:cond delay="0"/>
                             </p:stCondLst>
                             <p:childTnLst>
                               <p:par>
-                                <p:cTn id="84" presetID="22" presetClass="entr" presetSubtype="8" fill="hold" grpId="0" nodeType="clickEffect">
+                                <p:cTn id="90" presetID="22" presetClass="entr" presetSubtype="8" fill="hold" grpId="0" nodeType="clickEffect">
                                   <p:stCondLst>
                                     <p:cond delay="0"/>
                                   </p:stCondLst>
                                   <p:childTnLst>
                                     <p:set>
                                       <p:cBhvr>
-                                        <p:cTn id="85" dur="1" fill="hold">
+                                        <p:cTn id="91" dur="1" fill="hold">
                                           <p:stCondLst>
                                             <p:cond delay="0"/>
                                           </p:stCondLst>
@@ -12006,7 +12143,7 @@
                                     </p:set>
                                     <p:animEffect transition="in" filter="wipe(left)">
                                       <p:cBhvr>
-                                        <p:cTn id="86" dur="500"/>
+                                        <p:cTn id="92" dur="500"/>
                                         <p:tgtEl>
                                           <p:spTgt spid="4">
                                             <p:txEl>
@@ -12026,26 +12163,26 @@
                     </p:cTn>
                   </p:par>
                   <p:par>
-                    <p:cTn id="87" fill="hold">
+                    <p:cTn id="93" fill="hold">
                       <p:stCondLst>
                         <p:cond delay="indefinite"/>
                       </p:stCondLst>
                       <p:childTnLst>
                         <p:par>
-                          <p:cTn id="88" fill="hold">
+                          <p:cTn id="94" fill="hold">
                             <p:stCondLst>
                               <p:cond delay="0"/>
                             </p:stCondLst>
                             <p:childTnLst>
                               <p:par>
-                                <p:cTn id="89" presetID="22" presetClass="entr" presetSubtype="8" fill="hold" grpId="0" nodeType="clickEffect">
+                                <p:cTn id="95" presetID="22" presetClass="entr" presetSubtype="8" fill="hold" grpId="0" nodeType="clickEffect">
                                   <p:stCondLst>
                                     <p:cond delay="0"/>
                                   </p:stCondLst>
                                   <p:childTnLst>
                                     <p:set>
                                       <p:cBhvr>
-                                        <p:cTn id="90" dur="1" fill="hold">
+                                        <p:cTn id="96" dur="1" fill="hold">
                                           <p:stCondLst>
                                             <p:cond delay="0"/>
                                           </p:stCondLst>
@@ -12067,7 +12204,7 @@
                                     </p:set>
                                     <p:animEffect transition="in" filter="wipe(left)">
                                       <p:cBhvr>
-                                        <p:cTn id="91" dur="500"/>
+                                        <p:cTn id="97" dur="500"/>
                                         <p:tgtEl>
                                           <p:spTgt spid="4">
                                             <p:txEl>
@@ -12087,26 +12224,26 @@
                     </p:cTn>
                   </p:par>
                   <p:par>
-                    <p:cTn id="92" fill="hold">
+                    <p:cTn id="98" fill="hold">
                       <p:stCondLst>
                         <p:cond delay="indefinite"/>
                       </p:stCondLst>
                       <p:childTnLst>
                         <p:par>
-                          <p:cTn id="93" fill="hold">
+                          <p:cTn id="99" fill="hold">
                             <p:stCondLst>
                               <p:cond delay="0"/>
                             </p:stCondLst>
                             <p:childTnLst>
                               <p:par>
-                                <p:cTn id="94" presetID="22" presetClass="entr" presetSubtype="8" fill="hold" grpId="0" nodeType="clickEffect">
+                                <p:cTn id="100" presetID="22" presetClass="entr" presetSubtype="8" fill="hold" grpId="0" nodeType="clickEffect">
                                   <p:stCondLst>
                                     <p:cond delay="0"/>
                                   </p:stCondLst>
                                   <p:childTnLst>
                                     <p:set>
                                       <p:cBhvr>
-                                        <p:cTn id="95" dur="1" fill="hold">
+                                        <p:cTn id="101" dur="1" fill="hold">
                                           <p:stCondLst>
                                             <p:cond delay="0"/>
                                           </p:stCondLst>
@@ -12128,7 +12265,7 @@
                                     </p:set>
                                     <p:animEffect transition="in" filter="wipe(left)">
                                       <p:cBhvr>
-                                        <p:cTn id="96" dur="500"/>
+                                        <p:cTn id="102" dur="500"/>
                                         <p:tgtEl>
                                           <p:spTgt spid="4">
                                             <p:txEl>
@@ -12142,14 +12279,14 @@
                                 </p:cTn>
                               </p:par>
                               <p:par>
-                                <p:cTn id="97" presetID="22" presetClass="entr" presetSubtype="8" fill="hold" grpId="0" nodeType="withEffect">
+                                <p:cTn id="103" presetID="22" presetClass="entr" presetSubtype="8" fill="hold" grpId="0" nodeType="withEffect">
                                   <p:stCondLst>
                                     <p:cond delay="0"/>
                                   </p:stCondLst>
                                   <p:childTnLst>
                                     <p:set>
                                       <p:cBhvr>
-                                        <p:cTn id="98" dur="1" fill="hold">
+                                        <p:cTn id="104" dur="1" fill="hold">
                                           <p:stCondLst>
                                             <p:cond delay="0"/>
                                           </p:stCondLst>
@@ -12171,7 +12308,7 @@
                                     </p:set>
                                     <p:animEffect transition="in" filter="wipe(left)">
                                       <p:cBhvr>
-                                        <p:cTn id="99" dur="500"/>
+                                        <p:cTn id="105" dur="500"/>
                                         <p:tgtEl>
                                           <p:spTgt spid="4">
                                             <p:txEl>
@@ -12185,14 +12322,14 @@
                                 </p:cTn>
                               </p:par>
                               <p:par>
-                                <p:cTn id="100" presetID="22" presetClass="entr" presetSubtype="8" fill="hold" grpId="0" nodeType="withEffect">
+                                <p:cTn id="106" presetID="22" presetClass="entr" presetSubtype="8" fill="hold" grpId="0" nodeType="withEffect">
                                   <p:stCondLst>
                                     <p:cond delay="0"/>
                                   </p:stCondLst>
                                   <p:childTnLst>
                                     <p:set>
                                       <p:cBhvr>
-                                        <p:cTn id="101" dur="1" fill="hold">
+                                        <p:cTn id="107" dur="1" fill="hold">
                                           <p:stCondLst>
                                             <p:cond delay="0"/>
                                           </p:stCondLst>
@@ -12214,7 +12351,7 @@
                                     </p:set>
                                     <p:animEffect transition="in" filter="wipe(left)">
                                       <p:cBhvr>
-                                        <p:cTn id="102" dur="500"/>
+                                        <p:cTn id="108" dur="500"/>
                                         <p:tgtEl>
                                           <p:spTgt spid="4">
                                             <p:txEl>
@@ -12234,26 +12371,26 @@
                     </p:cTn>
                   </p:par>
                   <p:par>
-                    <p:cTn id="103" fill="hold">
+                    <p:cTn id="109" fill="hold">
                       <p:stCondLst>
                         <p:cond delay="indefinite"/>
                       </p:stCondLst>
                       <p:childTnLst>
                         <p:par>
-                          <p:cTn id="104" fill="hold">
+                          <p:cTn id="110" fill="hold">
                             <p:stCondLst>
                               <p:cond delay="0"/>
                             </p:stCondLst>
                             <p:childTnLst>
                               <p:par>
-                                <p:cTn id="105" presetID="22" presetClass="entr" presetSubtype="8" fill="hold" grpId="0" nodeType="clickEffect">
+                                <p:cTn id="111" presetID="22" presetClass="entr" presetSubtype="8" fill="hold" grpId="0" nodeType="clickEffect">
                                   <p:stCondLst>
                                     <p:cond delay="0"/>
                                   </p:stCondLst>
                                   <p:childTnLst>
                                     <p:set>
                                       <p:cBhvr>
-                                        <p:cTn id="106" dur="1" fill="hold">
+                                        <p:cTn id="112" dur="1" fill="hold">
                                           <p:stCondLst>
                                             <p:cond delay="0"/>
                                           </p:stCondLst>
@@ -12275,7 +12412,7 @@
                                     </p:set>
                                     <p:animEffect transition="in" filter="wipe(left)">
                                       <p:cBhvr>
-                                        <p:cTn id="107" dur="500"/>
+                                        <p:cTn id="113" dur="500"/>
                                         <p:tgtEl>
                                           <p:spTgt spid="4">
                                             <p:txEl>
@@ -12295,26 +12432,26 @@
                     </p:cTn>
                   </p:par>
                   <p:par>
-                    <p:cTn id="108" fill="hold">
+                    <p:cTn id="114" fill="hold">
                       <p:stCondLst>
                         <p:cond delay="indefinite"/>
                       </p:stCondLst>
                       <p:childTnLst>
                         <p:par>
-                          <p:cTn id="109" fill="hold">
+                          <p:cTn id="115" fill="hold">
                             <p:stCondLst>
                               <p:cond delay="0"/>
                             </p:stCondLst>
                             <p:childTnLst>
                               <p:par>
-                                <p:cTn id="110" presetID="22" presetClass="entr" presetSubtype="8" fill="hold" grpId="0" nodeType="clickEffect">
+                                <p:cTn id="116" presetID="22" presetClass="entr" presetSubtype="8" fill="hold" grpId="0" nodeType="clickEffect">
                                   <p:stCondLst>
                                     <p:cond delay="0"/>
                                   </p:stCondLst>
                                   <p:childTnLst>
                                     <p:set>
                                       <p:cBhvr>
-                                        <p:cTn id="111" dur="1" fill="hold">
+                                        <p:cTn id="117" dur="1" fill="hold">
                                           <p:stCondLst>
                                             <p:cond delay="0"/>
                                           </p:stCondLst>
@@ -12336,7 +12473,7 @@
                                     </p:set>
                                     <p:animEffect transition="in" filter="wipe(left)">
                                       <p:cBhvr>
-                                        <p:cTn id="112" dur="500"/>
+                                        <p:cTn id="118" dur="500"/>
                                         <p:tgtEl>
                                           <p:spTgt spid="4">
                                             <p:txEl>
@@ -12350,14 +12487,14 @@
                                 </p:cTn>
                               </p:par>
                               <p:par>
-                                <p:cTn id="113" presetID="22" presetClass="entr" presetSubtype="8" fill="hold" nodeType="withEffect">
+                                <p:cTn id="119" presetID="22" presetClass="entr" presetSubtype="8" fill="hold" nodeType="withEffect">
                                   <p:stCondLst>
                                     <p:cond delay="0"/>
                                   </p:stCondLst>
                                   <p:childTnLst>
                                     <p:set>
                                       <p:cBhvr>
-                                        <p:cTn id="114" dur="1" fill="hold">
+                                        <p:cTn id="120" dur="1" fill="hold">
                                           <p:stCondLst>
                                             <p:cond delay="0"/>
                                           </p:stCondLst>
@@ -12379,7 +12516,7 @@
                                     </p:set>
                                     <p:animEffect transition="in" filter="wipe(left)">
                                       <p:cBhvr>
-                                        <p:cTn id="115" dur="500"/>
+                                        <p:cTn id="121" dur="500"/>
                                         <p:tgtEl>
                                           <p:spTgt spid="4">
                                             <p:txEl>
@@ -12399,26 +12536,26 @@
                     </p:cTn>
                   </p:par>
                   <p:par>
-                    <p:cTn id="116" fill="hold">
+                    <p:cTn id="122" fill="hold">
                       <p:stCondLst>
                         <p:cond delay="indefinite"/>
                       </p:stCondLst>
                       <p:childTnLst>
                         <p:par>
-                          <p:cTn id="117" fill="hold">
+                          <p:cTn id="123" fill="hold">
                             <p:stCondLst>
                               <p:cond delay="0"/>
                             </p:stCondLst>
                             <p:childTnLst>
                               <p:par>
-                                <p:cTn id="118" presetID="2" presetClass="entr" presetSubtype="4" fill="hold" grpId="0" nodeType="clickEffect">
+                                <p:cTn id="124" presetID="2" presetClass="entr" presetSubtype="4" fill="hold" grpId="0" nodeType="clickEffect">
                                   <p:stCondLst>
                                     <p:cond delay="0"/>
                                   </p:stCondLst>
                                   <p:childTnLst>
                                     <p:set>
                                       <p:cBhvr>
-                                        <p:cTn id="119" dur="1" fill="hold">
+                                        <p:cTn id="125" dur="1" fill="hold">
                                           <p:stCondLst>
                                             <p:cond delay="0"/>
                                           </p:stCondLst>
@@ -12426,7 +12563,7 @@
                                         <p:tgtEl>
                                           <p:spTgt spid="3">
                                             <p:txEl>
-                                              <p:pRg st="6" end="6"/>
+                                              <p:pRg st="7" end="7"/>
                                             </p:txEl>
                                           </p:spTgt>
                                         </p:tgtEl>
@@ -12440,11 +12577,11 @@
                                     </p:set>
                                     <p:anim calcmode="lin" valueType="num">
                                       <p:cBhvr additive="base">
-                                        <p:cTn id="120" dur="500" fill="hold"/>
+                                        <p:cTn id="126" dur="500" fill="hold"/>
                                         <p:tgtEl>
                                           <p:spTgt spid="3">
                                             <p:txEl>
-                                              <p:pRg st="6" end="6"/>
+                                              <p:pRg st="7" end="7"/>
                                             </p:txEl>
                                           </p:spTgt>
                                         </p:tgtEl>
@@ -12467,11 +12604,11 @@
                                     </p:anim>
                                     <p:anim calcmode="lin" valueType="num">
                                       <p:cBhvr additive="base">
-                                        <p:cTn id="121" dur="500" fill="hold"/>
+                                        <p:cTn id="127" dur="500" fill="hold"/>
                                         <p:tgtEl>
                                           <p:spTgt spid="3">
                                             <p:txEl>
-                                              <p:pRg st="6" end="6"/>
+                                              <p:pRg st="7" end="7"/>
                                             </p:txEl>
                                           </p:spTgt>
                                         </p:tgtEl>
@@ -12496,14 +12633,14 @@
                                 </p:cTn>
                               </p:par>
                               <p:par>
-                                <p:cTn id="122" presetID="2" presetClass="entr" presetSubtype="4" fill="hold" grpId="0" nodeType="withEffect">
+                                <p:cTn id="128" presetID="2" presetClass="entr" presetSubtype="4" fill="hold" grpId="0" nodeType="withEffect">
                                   <p:stCondLst>
                                     <p:cond delay="0"/>
                                   </p:stCondLst>
                                   <p:childTnLst>
                                     <p:set>
                                       <p:cBhvr>
-                                        <p:cTn id="123" dur="1" fill="hold">
+                                        <p:cTn id="129" dur="1" fill="hold">
                                           <p:stCondLst>
                                             <p:cond delay="0"/>
                                           </p:stCondLst>
@@ -12511,7 +12648,7 @@
                                         <p:tgtEl>
                                           <p:spTgt spid="3">
                                             <p:txEl>
-                                              <p:pRg st="7" end="7"/>
+                                              <p:pRg st="8" end="8"/>
                                             </p:txEl>
                                           </p:spTgt>
                                         </p:tgtEl>
@@ -12525,11 +12662,11 @@
                                     </p:set>
                                     <p:anim calcmode="lin" valueType="num">
                                       <p:cBhvr additive="base">
-                                        <p:cTn id="124" dur="500" fill="hold"/>
+                                        <p:cTn id="130" dur="500" fill="hold"/>
                                         <p:tgtEl>
                                           <p:spTgt spid="3">
                                             <p:txEl>
-                                              <p:pRg st="7" end="7"/>
+                                              <p:pRg st="8" end="8"/>
                                             </p:txEl>
                                           </p:spTgt>
                                         </p:tgtEl>
@@ -12552,11 +12689,11 @@
                                     </p:anim>
                                     <p:anim calcmode="lin" valueType="num">
                                       <p:cBhvr additive="base">
-                                        <p:cTn id="125" dur="500" fill="hold"/>
+                                        <p:cTn id="131" dur="500" fill="hold"/>
                                         <p:tgtEl>
                                           <p:spTgt spid="3">
                                             <p:txEl>
-                                              <p:pRg st="7" end="7"/>
+                                              <p:pRg st="8" end="8"/>
                                             </p:txEl>
                                           </p:spTgt>
                                         </p:tgtEl>
@@ -33533,6 +33670,113 @@
                                   </p:childTnLst>
                                 </p:cTn>
                               </p:par>
+                              <p:par>
+                                <p:cTn id="108" presetID="1" presetClass="entr" presetSubtype="0" fill="hold" grpId="0" nodeType="withEffect">
+                                  <p:stCondLst>
+                                    <p:cond delay="0"/>
+                                  </p:stCondLst>
+                                  <p:childTnLst>
+                                    <p:set>
+                                      <p:cBhvr>
+                                        <p:cTn id="109" dur="1" fill="hold">
+                                          <p:stCondLst>
+                                            <p:cond delay="0"/>
+                                          </p:stCondLst>
+                                        </p:cTn>
+                                        <p:tgtEl>
+                                          <p:spTgt spid="3"/>
+                                        </p:tgtEl>
+                                        <p:attrNameLst>
+                                          <p:attrName>style.visibility</p:attrName>
+                                        </p:attrNameLst>
+                                      </p:cBhvr>
+                                      <p:to>
+                                        <p:strVal val="visible"/>
+                                      </p:to>
+                                    </p:set>
+                                  </p:childTnLst>
+                                </p:cTn>
+                              </p:par>
+                              <p:par>
+                                <p:cTn id="110" presetID="1" presetClass="entr" presetSubtype="0" fill="hold" grpId="0" nodeType="withEffect">
+                                  <p:stCondLst>
+                                    <p:cond delay="0"/>
+                                  </p:stCondLst>
+                                  <p:childTnLst>
+                                    <p:set>
+                                      <p:cBhvr>
+                                        <p:cTn id="111" dur="1" fill="hold">
+                                          <p:stCondLst>
+                                            <p:cond delay="0"/>
+                                          </p:stCondLst>
+                                        </p:cTn>
+                                        <p:tgtEl>
+                                          <p:spTgt spid="12"/>
+                                        </p:tgtEl>
+                                        <p:attrNameLst>
+                                          <p:attrName>style.visibility</p:attrName>
+                                        </p:attrNameLst>
+                                      </p:cBhvr>
+                                      <p:to>
+                                        <p:strVal val="visible"/>
+                                      </p:to>
+                                    </p:set>
+                                  </p:childTnLst>
+                                </p:cTn>
+                              </p:par>
+                            </p:childTnLst>
+                          </p:cTn>
+                        </p:par>
+                      </p:childTnLst>
+                    </p:cTn>
+                  </p:par>
+                  <p:par>
+                    <p:cTn id="112" fill="hold">
+                      <p:stCondLst>
+                        <p:cond delay="indefinite"/>
+                      </p:stCondLst>
+                      <p:childTnLst>
+                        <p:par>
+                          <p:cTn id="113" fill="hold">
+                            <p:stCondLst>
+                              <p:cond delay="0"/>
+                            </p:stCondLst>
+                            <p:childTnLst>
+                              <p:par>
+                                <p:cTn id="114" presetID="3" presetClass="entr" presetSubtype="10" fill="hold" grpId="0" nodeType="clickEffect">
+                                  <p:stCondLst>
+                                    <p:cond delay="0"/>
+                                  </p:stCondLst>
+                                  <p:childTnLst>
+                                    <p:set>
+                                      <p:cBhvr>
+                                        <p:cTn id="115" dur="1" fill="hold">
+                                          <p:stCondLst>
+                                            <p:cond delay="0"/>
+                                          </p:stCondLst>
+                                        </p:cTn>
+                                        <p:tgtEl>
+                                          <p:spTgt spid="19"/>
+                                        </p:tgtEl>
+                                        <p:attrNameLst>
+                                          <p:attrName>style.visibility</p:attrName>
+                                        </p:attrNameLst>
+                                      </p:cBhvr>
+                                      <p:to>
+                                        <p:strVal val="visible"/>
+                                      </p:to>
+                                    </p:set>
+                                    <p:animEffect transition="in" filter="blinds(horizontal)">
+                                      <p:cBhvr>
+                                        <p:cTn id="116" dur="500"/>
+                                        <p:tgtEl>
+                                          <p:spTgt spid="19"/>
+                                        </p:tgtEl>
+                                      </p:cBhvr>
+                                    </p:animEffect>
+                                  </p:childTnLst>
+                                </p:cTn>
+                              </p:par>
                             </p:childTnLst>
                           </p:cTn>
                         </p:par>
@@ -33563,6 +33807,9 @@
     <p:bldLst>
       <p:bldP spid="10" grpId="0" uiExpand="1" build="p" animBg="1"/>
       <p:bldP spid="6" grpId="0" uiExpand="1" build="p" animBg="1"/>
+      <p:bldP spid="3" grpId="0"/>
+      <p:bldP spid="12" grpId="0"/>
+      <p:bldP spid="19" grpId="0"/>
     </p:bldLst>
   </p:timing>
 </p:sld>

</xml_diff>